<commit_message>
fix small errors in chapter references.
</commit_message>
<xml_diff>
--- a/classes/stats2015/Lecture18.pptx
+++ b/classes/stats2015/Lecture18.pptx
@@ -325,7 +325,7 @@
             <a:fld id="{1D8BD707-D9CF-40AE-B4C6-C98DA3205C09}" type="datetimeFigureOut">
               <a:rPr lang="en-US" smtClean="0"/>
               <a:pPr/>
-              <a:t>4/5/2015</a:t>
+              <a:t>4/6/2015</a:t>
             </a:fld>
             <a:endParaRPr lang="en-US"/>
           </a:p>
@@ -492,7 +492,7 @@
             <a:fld id="{1D8BD707-D9CF-40AE-B4C6-C98DA3205C09}" type="datetimeFigureOut">
               <a:rPr lang="en-US" smtClean="0"/>
               <a:pPr/>
-              <a:t>4/5/2015</a:t>
+              <a:t>4/6/2015</a:t>
             </a:fld>
             <a:endParaRPr lang="en-US"/>
           </a:p>
@@ -669,7 +669,7 @@
             <a:fld id="{1D8BD707-D9CF-40AE-B4C6-C98DA3205C09}" type="datetimeFigureOut">
               <a:rPr lang="en-US" smtClean="0"/>
               <a:pPr/>
-              <a:t>4/5/2015</a:t>
+              <a:t>4/6/2015</a:t>
             </a:fld>
             <a:endParaRPr lang="en-US"/>
           </a:p>
@@ -836,7 +836,7 @@
             <a:fld id="{1D8BD707-D9CF-40AE-B4C6-C98DA3205C09}" type="datetimeFigureOut">
               <a:rPr lang="en-US" smtClean="0"/>
               <a:pPr/>
-              <a:t>4/5/2015</a:t>
+              <a:t>4/6/2015</a:t>
             </a:fld>
             <a:endParaRPr lang="en-US"/>
           </a:p>
@@ -1079,7 +1079,7 @@
             <a:fld id="{1D8BD707-D9CF-40AE-B4C6-C98DA3205C09}" type="datetimeFigureOut">
               <a:rPr lang="en-US" smtClean="0"/>
               <a:pPr/>
-              <a:t>4/5/2015</a:t>
+              <a:t>4/6/2015</a:t>
             </a:fld>
             <a:endParaRPr lang="en-US"/>
           </a:p>
@@ -1364,7 +1364,7 @@
             <a:fld id="{1D8BD707-D9CF-40AE-B4C6-C98DA3205C09}" type="datetimeFigureOut">
               <a:rPr lang="en-US" smtClean="0"/>
               <a:pPr/>
-              <a:t>4/5/2015</a:t>
+              <a:t>4/6/2015</a:t>
             </a:fld>
             <a:endParaRPr lang="en-US"/>
           </a:p>
@@ -1783,7 +1783,7 @@
             <a:fld id="{1D8BD707-D9CF-40AE-B4C6-C98DA3205C09}" type="datetimeFigureOut">
               <a:rPr lang="en-US" smtClean="0"/>
               <a:pPr/>
-              <a:t>4/5/2015</a:t>
+              <a:t>4/6/2015</a:t>
             </a:fld>
             <a:endParaRPr lang="en-US"/>
           </a:p>
@@ -1898,7 +1898,7 @@
             <a:fld id="{1D8BD707-D9CF-40AE-B4C6-C98DA3205C09}" type="datetimeFigureOut">
               <a:rPr lang="en-US" smtClean="0"/>
               <a:pPr/>
-              <a:t>4/5/2015</a:t>
+              <a:t>4/6/2015</a:t>
             </a:fld>
             <a:endParaRPr lang="en-US"/>
           </a:p>
@@ -1990,7 +1990,7 @@
             <a:fld id="{1D8BD707-D9CF-40AE-B4C6-C98DA3205C09}" type="datetimeFigureOut">
               <a:rPr lang="en-US" smtClean="0"/>
               <a:pPr/>
-              <a:t>4/5/2015</a:t>
+              <a:t>4/6/2015</a:t>
             </a:fld>
             <a:endParaRPr lang="en-US"/>
           </a:p>
@@ -2264,7 +2264,7 @@
             <a:fld id="{1D8BD707-D9CF-40AE-B4C6-C98DA3205C09}" type="datetimeFigureOut">
               <a:rPr lang="en-US" smtClean="0"/>
               <a:pPr/>
-              <a:t>4/5/2015</a:t>
+              <a:t>4/6/2015</a:t>
             </a:fld>
             <a:endParaRPr lang="en-US"/>
           </a:p>
@@ -2514,7 +2514,7 @@
             <a:fld id="{1D8BD707-D9CF-40AE-B4C6-C98DA3205C09}" type="datetimeFigureOut">
               <a:rPr lang="en-US" smtClean="0"/>
               <a:pPr/>
-              <a:t>4/5/2015</a:t>
+              <a:t>4/6/2015</a:t>
             </a:fld>
             <a:endParaRPr lang="en-US"/>
           </a:p>
@@ -2724,7 +2724,7 @@
             <a:fld id="{1D8BD707-D9CF-40AE-B4C6-C98DA3205C09}" type="datetimeFigureOut">
               <a:rPr lang="en-US" smtClean="0"/>
               <a:pPr/>
-              <a:t>4/5/2015</a:t>
+              <a:t>4/6/2015</a:t>
             </a:fld>
             <a:endParaRPr lang="en-US"/>
           </a:p>
@@ -4450,25 +4450,7 @@
                 </a:solidFill>
                 <a:sym typeface="Symbol"/>
               </a:rPr>
-              <a:t> </a:t>
-            </a:r>
-            <a:r>
-              <a:rPr lang="en-US" dirty="0" smtClean="0">
-                <a:solidFill>
-                  <a:srgbClr val="FF0000"/>
-                </a:solidFill>
-                <a:sym typeface="Symbol"/>
-              </a:rPr>
-              <a:t>.  (from the assum</a:t>
-            </a:r>
-            <a:r>
-              <a:rPr lang="en-US" dirty="0" smtClean="0">
-                <a:solidFill>
-                  <a:srgbClr val="FF0000"/>
-                </a:solidFill>
-                <a:sym typeface="Symbol"/>
-              </a:rPr>
-              <a:t>ption of constant</a:t>
+              <a:t> .  (from the assumption of constant</a:t>
             </a:r>
           </a:p>
           <a:p>
@@ -4481,12 +4463,6 @@
               </a:rPr>
               <a:t>variance across all x positions)</a:t>
             </a:r>
-            <a:endParaRPr lang="en-US" dirty="0" smtClean="0">
-              <a:solidFill>
-                <a:srgbClr val="FF0000"/>
-              </a:solidFill>
-              <a:sym typeface="Symbol"/>
-            </a:endParaRPr>
           </a:p>
           <a:p>
             <a:endParaRPr lang="en-US" dirty="0" smtClean="0">
@@ -5952,15 +5928,7 @@
           <a:p>
             <a:r>
               <a:rPr lang="en-US" dirty="0" smtClean="0"/>
-              <a:t>We want our variance-covariance matrix </a:t>
-            </a:r>
-            <a:r>
-              <a:rPr lang="en-US" dirty="0" smtClean="0"/>
-              <a:t>(within each hospital) to </a:t>
-            </a:r>
-            <a:r>
-              <a:rPr lang="en-US" dirty="0" smtClean="0"/>
-              <a:t>look like this… </a:t>
+              <a:t>We want our variance-covariance matrix (within each hospital) to look like this… </a:t>
             </a:r>
             <a:endParaRPr lang="en-US" dirty="0"/>
           </a:p>
@@ -6351,11 +6319,7 @@
           <a:p>
             <a:r>
               <a:rPr lang="en-US" dirty="0" smtClean="0"/>
-              <a:t>size </a:t>
-            </a:r>
-            <a:r>
-              <a:rPr lang="en-US" dirty="0" smtClean="0"/>
-              <a:t>of parameter </a:t>
+              <a:t>size of parameter </a:t>
             </a:r>
             <a:r>
               <a:rPr lang="en-US" dirty="0" smtClean="0">
@@ -6577,15 +6541,7 @@
           <a:p>
             <a:r>
               <a:rPr lang="en-US" dirty="0" smtClean="0"/>
-              <a:t>So our variance-covariance matrix </a:t>
-            </a:r>
-            <a:r>
-              <a:rPr lang="en-US" dirty="0" smtClean="0"/>
-              <a:t>for each hospital goes </a:t>
-            </a:r>
-            <a:r>
-              <a:rPr lang="en-US" dirty="0" smtClean="0"/>
-              <a:t>from something that looks like this….</a:t>
+              <a:t>So our variance-covariance matrix for each hospital goes from something that looks like this….</a:t>
             </a:r>
             <a:endParaRPr lang="en-US" dirty="0"/>
           </a:p>
@@ -7993,7 +7949,7 @@
         <p:spPr>
           <a:xfrm>
             <a:off x="1219200" y="76200"/>
-            <a:ext cx="7711535" cy="923330"/>
+            <a:ext cx="7828553" cy="923330"/>
           </a:xfrm>
           <a:prstGeom prst="rect">
             <a:avLst/>
@@ -8014,7 +7970,15 @@
           <a:p>
             <a:r>
               <a:rPr lang="en-US" dirty="0" smtClean="0"/>
-              <a:t>Covariance-variance matrix (see chapter 7 of </a:t>
+              <a:t>Covariance-variance matrix (see chapter </a:t>
+            </a:r>
+            <a:r>
+              <a:rPr lang="en-US" dirty="0" smtClean="0"/>
+              <a:t>10 </a:t>
+            </a:r>
+            <a:r>
+              <a:rPr lang="en-US" dirty="0" smtClean="0"/>
+              <a:t>of </a:t>
             </a:r>
             <a:r>
               <a:rPr lang="en-US" dirty="0" err="1" smtClean="0"/>
@@ -8506,14 +8470,14 @@
           </a:ln>
           <a:extLst>
             <a:ext uri="{909E8E84-426E-40dd-AFC4-6F175D3DCCD1}">
-              <a14:hiddenFill xmlns:a14="http://schemas.microsoft.com/office/drawing/2010/main" xmlns="">
+              <a14:hiddenFill xmlns="" xmlns:a14="http://schemas.microsoft.com/office/drawing/2010/main">
                 <a:solidFill>
                   <a:srgbClr val="FFFFFF"/>
                 </a:solidFill>
               </a14:hiddenFill>
             </a:ext>
             <a:ext uri="{91240B29-F687-4f45-9708-019B960494DF}">
-              <a14:hiddenLine xmlns:a14="http://schemas.microsoft.com/office/drawing/2010/main" xmlns="" w="9525">
+              <a14:hiddenLine xmlns="" xmlns:a14="http://schemas.microsoft.com/office/drawing/2010/main" w="9525">
                 <a:solidFill>
                   <a:srgbClr val="000000"/>
                 </a:solidFill>
@@ -8657,21 +8621,7 @@
                 <a:latin typeface="Arial"/>
                 <a:cs typeface="Arial"/>
               </a:rPr>
-              <a:t>   </a:t>
-            </a:r>
-            <a:r>
-              <a:rPr lang="en-US" sz="1800" dirty="0" smtClean="0">
-                <a:latin typeface="Arial"/>
-                <a:cs typeface="Arial"/>
-              </a:rPr>
-              <a:t>drug</a:t>
-            </a:r>
-            <a:r>
-              <a:rPr lang="en-US" sz="1800" dirty="0" smtClean="0">
-                <a:latin typeface="Arial"/>
-                <a:cs typeface="Arial"/>
-              </a:rPr>
-              <a:t>   +  (hospital) </a:t>
+              <a:t>   drug   +  (hospital) </a:t>
             </a:r>
             <a:r>
               <a:rPr lang="en-US" sz="1800" dirty="0">
@@ -8738,14 +8688,14 @@
           </a:ln>
           <a:extLst>
             <a:ext uri="{909E8E84-426E-40dd-AFC4-6F175D3DCCD1}">
-              <a14:hiddenFill xmlns:a14="http://schemas.microsoft.com/office/drawing/2010/main" xmlns="">
+              <a14:hiddenFill xmlns="" xmlns:a14="http://schemas.microsoft.com/office/drawing/2010/main">
                 <a:solidFill>
                   <a:srgbClr val="FFFFFF"/>
                 </a:solidFill>
               </a14:hiddenFill>
             </a:ext>
             <a:ext uri="{91240B29-F687-4f45-9708-019B960494DF}">
-              <a14:hiddenLine xmlns:a14="http://schemas.microsoft.com/office/drawing/2010/main" xmlns="" w="9525">
+              <a14:hiddenLine xmlns="" xmlns:a14="http://schemas.microsoft.com/office/drawing/2010/main" w="9525">
                 <a:solidFill>
                   <a:srgbClr val="000000"/>
                 </a:solidFill>
@@ -8951,14 +8901,14 @@
           </a:ln>
           <a:extLst>
             <a:ext uri="{909E8E84-426E-40dd-AFC4-6F175D3DCCD1}">
-              <a14:hiddenFill xmlns:a14="http://schemas.microsoft.com/office/drawing/2010/main" xmlns="">
+              <a14:hiddenFill xmlns="" xmlns:a14="http://schemas.microsoft.com/office/drawing/2010/main">
                 <a:solidFill>
                   <a:srgbClr val="FFFFFF"/>
                 </a:solidFill>
               </a14:hiddenFill>
             </a:ext>
             <a:ext uri="{91240B29-F687-4f45-9708-019B960494DF}">
-              <a14:hiddenLine xmlns:a14="http://schemas.microsoft.com/office/drawing/2010/main" xmlns="" w="9525">
+              <a14:hiddenLine xmlns="" xmlns:a14="http://schemas.microsoft.com/office/drawing/2010/main" w="9525">
                 <a:solidFill>
                   <a:srgbClr val="000000"/>
                 </a:solidFill>
@@ -9435,11 +9385,7 @@
             </a:r>
             <a:r>
               <a:rPr lang="en-US" dirty="0" smtClean="0"/>
-              <a:t> </a:t>
-            </a:r>
-            <a:r>
-              <a:rPr lang="en-US" dirty="0" smtClean="0"/>
-              <a:t>function in the </a:t>
+              <a:t> function in the </a:t>
             </a:r>
           </a:p>
           <a:p>
@@ -9449,11 +9395,7 @@
             </a:r>
             <a:r>
               <a:rPr lang="en-US" dirty="0" smtClean="0"/>
-              <a:t> </a:t>
-            </a:r>
-            <a:r>
-              <a:rPr lang="en-US" dirty="0" smtClean="0"/>
-              <a:t>package</a:t>
+              <a:t> package</a:t>
             </a:r>
           </a:p>
           <a:p>
@@ -9473,7 +9415,15 @@
           <a:p>
             <a:r>
               <a:rPr lang="en-US" dirty="0" smtClean="0"/>
-              <a:t>Chapter 10 in </a:t>
+              <a:t>Chapter </a:t>
+            </a:r>
+            <a:r>
+              <a:rPr lang="en-US" dirty="0" smtClean="0"/>
+              <a:t>13 </a:t>
+            </a:r>
+            <a:r>
+              <a:rPr lang="en-US" dirty="0" smtClean="0"/>
+              <a:t>in </a:t>
             </a:r>
             <a:r>
               <a:rPr lang="en-US" dirty="0" err="1" smtClean="0"/>
@@ -9550,11 +9500,7 @@
           <a:p>
             <a:r>
               <a:rPr lang="en-US" dirty="0" smtClean="0"/>
-              <a:t>(see Chapter </a:t>
-            </a:r>
-            <a:r>
-              <a:rPr lang="en-US" dirty="0" smtClean="0"/>
-              <a:t>5 (section 5.5) in </a:t>
+              <a:t>(see Chapter 5 (section 5.5) in </a:t>
             </a:r>
             <a:r>
               <a:rPr lang="en-US" dirty="0" err="1" smtClean="0"/>
@@ -9564,7 +9510,6 @@
               <a:rPr lang="en-US" dirty="0" smtClean="0"/>
               <a:t> for more details)</a:t>
             </a:r>
-            <a:endParaRPr lang="en-US" dirty="0" smtClean="0"/>
           </a:p>
           <a:p>
             <a:endParaRPr lang="en-US" dirty="0"/>
@@ -10610,13 +10555,7 @@
               <a:rPr lang="en-US" dirty="0" smtClean="0">
                 <a:sym typeface="Symbol"/>
               </a:rPr>
-              <a:t>/(</a:t>
-            </a:r>
-            <a:r>
-              <a:rPr lang="en-US" dirty="0" smtClean="0">
-                <a:sym typeface="Symbol"/>
-              </a:rPr>
-              <a:t></a:t>
+              <a:t>/(</a:t>
             </a:r>
             <a:r>
               <a:rPr lang="en-US" baseline="30000" dirty="0" smtClean="0">
@@ -10628,19 +10567,7 @@
               <a:rPr lang="en-US" dirty="0" smtClean="0">
                 <a:sym typeface="Symbol"/>
               </a:rPr>
-              <a:t> +</a:t>
-            </a:r>
-            <a:r>
-              <a:rPr lang="en-US" dirty="0" smtClean="0">
-                <a:sym typeface="Symbol"/>
-              </a:rPr>
-              <a:t> </a:t>
-            </a:r>
-            <a:r>
-              <a:rPr lang="en-US" dirty="0" smtClean="0">
-                <a:sym typeface="Symbol"/>
-              </a:rPr>
-              <a:t></a:t>
+              <a:t> + </a:t>
             </a:r>
             <a:r>
               <a:rPr lang="en-US" baseline="30000" dirty="0" smtClean="0">
@@ -10688,11 +10615,7 @@
           <a:p>
             <a:r>
               <a:rPr lang="en-US" dirty="0" smtClean="0"/>
-              <a:t>c</a:t>
-            </a:r>
-            <a:r>
-              <a:rPr lang="en-US" dirty="0" smtClean="0"/>
-              <a:t>orrelations within each group.  As it approaches 0, the hospital effect disappears.  As it approaches 1, the hospital effect explains all the data.  </a:t>
+              <a:t>correlations within each group.  As it approaches 0, the hospital effect disappears.  As it approaches 1, the hospital effect explains all the data.  </a:t>
             </a:r>
             <a:endParaRPr lang="en-US" dirty="0"/>
           </a:p>

</xml_diff>